<commit_message>
modified og tag image
</commit_message>
<xml_diff>
--- a/images/game-of-life_OG-tag-image.pptx
+++ b/images/game-of-life_OG-tag-image.pptx
@@ -104,6 +104,11 @@
       </a:defRPr>
     </a:lvl9pPr>
   </p:defaultTextStyle>
+  <p:extLst>
+    <p:ext uri="{EFAFB233-063F-42B5-8137-9DF3F51BA10A}">
+      <p15:sldGuideLst xmlns:p15="http://schemas.microsoft.com/office/powerpoint/2012/main"/>
+    </p:ext>
+  </p:extLst>
 </p:presentation>
 </file>
 
@@ -254,7 +259,7 @@
           <a:p>
             <a:fld id="{49CDC7EE-585A-2A4F-8F5F-EE6C49B6D9AB}" type="datetimeFigureOut">
               <a:rPr lang="en-US" smtClean="0"/>
-              <a:t>8/21/21</a:t>
+              <a:t>8/22/21</a:t>
             </a:fld>
             <a:endParaRPr lang="en-US"/>
           </a:p>
@@ -452,7 +457,7 @@
           <a:p>
             <a:fld id="{49CDC7EE-585A-2A4F-8F5F-EE6C49B6D9AB}" type="datetimeFigureOut">
               <a:rPr lang="en-US" smtClean="0"/>
-              <a:t>8/21/21</a:t>
+              <a:t>8/22/21</a:t>
             </a:fld>
             <a:endParaRPr lang="en-US"/>
           </a:p>
@@ -660,7 +665,7 @@
           <a:p>
             <a:fld id="{49CDC7EE-585A-2A4F-8F5F-EE6C49B6D9AB}" type="datetimeFigureOut">
               <a:rPr lang="en-US" smtClean="0"/>
-              <a:t>8/21/21</a:t>
+              <a:t>8/22/21</a:t>
             </a:fld>
             <a:endParaRPr lang="en-US"/>
           </a:p>
@@ -858,7 +863,7 @@
           <a:p>
             <a:fld id="{49CDC7EE-585A-2A4F-8F5F-EE6C49B6D9AB}" type="datetimeFigureOut">
               <a:rPr lang="en-US" smtClean="0"/>
-              <a:t>8/21/21</a:t>
+              <a:t>8/22/21</a:t>
             </a:fld>
             <a:endParaRPr lang="en-US"/>
           </a:p>
@@ -1133,7 +1138,7 @@
           <a:p>
             <a:fld id="{49CDC7EE-585A-2A4F-8F5F-EE6C49B6D9AB}" type="datetimeFigureOut">
               <a:rPr lang="en-US" smtClean="0"/>
-              <a:t>8/21/21</a:t>
+              <a:t>8/22/21</a:t>
             </a:fld>
             <a:endParaRPr lang="en-US"/>
           </a:p>
@@ -1398,7 +1403,7 @@
           <a:p>
             <a:fld id="{49CDC7EE-585A-2A4F-8F5F-EE6C49B6D9AB}" type="datetimeFigureOut">
               <a:rPr lang="en-US" smtClean="0"/>
-              <a:t>8/21/21</a:t>
+              <a:t>8/22/21</a:t>
             </a:fld>
             <a:endParaRPr lang="en-US"/>
           </a:p>
@@ -1810,7 +1815,7 @@
           <a:p>
             <a:fld id="{49CDC7EE-585A-2A4F-8F5F-EE6C49B6D9AB}" type="datetimeFigureOut">
               <a:rPr lang="en-US" smtClean="0"/>
-              <a:t>8/21/21</a:t>
+              <a:t>8/22/21</a:t>
             </a:fld>
             <a:endParaRPr lang="en-US"/>
           </a:p>
@@ -1951,7 +1956,7 @@
           <a:p>
             <a:fld id="{49CDC7EE-585A-2A4F-8F5F-EE6C49B6D9AB}" type="datetimeFigureOut">
               <a:rPr lang="en-US" smtClean="0"/>
-              <a:t>8/21/21</a:t>
+              <a:t>8/22/21</a:t>
             </a:fld>
             <a:endParaRPr lang="en-US"/>
           </a:p>
@@ -2064,7 +2069,7 @@
           <a:p>
             <a:fld id="{49CDC7EE-585A-2A4F-8F5F-EE6C49B6D9AB}" type="datetimeFigureOut">
               <a:rPr lang="en-US" smtClean="0"/>
-              <a:t>8/21/21</a:t>
+              <a:t>8/22/21</a:t>
             </a:fld>
             <a:endParaRPr lang="en-US"/>
           </a:p>
@@ -2375,7 +2380,7 @@
           <a:p>
             <a:fld id="{49CDC7EE-585A-2A4F-8F5F-EE6C49B6D9AB}" type="datetimeFigureOut">
               <a:rPr lang="en-US" smtClean="0"/>
-              <a:t>8/21/21</a:t>
+              <a:t>8/22/21</a:t>
             </a:fld>
             <a:endParaRPr lang="en-US"/>
           </a:p>
@@ -2663,7 +2668,7 @@
           <a:p>
             <a:fld id="{49CDC7EE-585A-2A4F-8F5F-EE6C49B6D9AB}" type="datetimeFigureOut">
               <a:rPr lang="en-US" smtClean="0"/>
-              <a:t>8/21/21</a:t>
+              <a:t>8/22/21</a:t>
             </a:fld>
             <a:endParaRPr lang="en-US"/>
           </a:p>
@@ -2904,7 +2909,7 @@
           <a:p>
             <a:fld id="{49CDC7EE-585A-2A4F-8F5F-EE6C49B6D9AB}" type="datetimeFigureOut">
               <a:rPr lang="en-US" smtClean="0"/>
-              <a:t>8/21/21</a:t>
+              <a:t>8/22/21</a:t>
             </a:fld>
             <a:endParaRPr lang="en-US"/>
           </a:p>
@@ -3335,10 +3340,10 @@
         </p:nvGrpSpPr>
         <p:grpSpPr>
           <a:xfrm>
-            <a:off x="883404" y="1635840"/>
-            <a:ext cx="10425192" cy="3586320"/>
-            <a:chOff x="2391353" y="2075180"/>
-            <a:chExt cx="7740720" cy="2660273"/>
+            <a:off x="1800298" y="1500726"/>
+            <a:ext cx="8128894" cy="4217240"/>
+            <a:chOff x="5893091" y="2443809"/>
+            <a:chExt cx="6035716" cy="3128276"/>
           </a:xfrm>
         </p:grpSpPr>
         <p:sp>
@@ -3355,8 +3360,8 @@
           </p:nvSpPr>
           <p:spPr>
             <a:xfrm>
-              <a:off x="5834052" y="2075180"/>
-              <a:ext cx="4298021" cy="1301330"/>
+              <a:off x="5893091" y="2443809"/>
+              <a:ext cx="6035716" cy="684911"/>
             </a:xfrm>
             <a:prstGeom prst="rect">
               <a:avLst/>
@@ -3407,44 +3412,8 @@
           </p:blipFill>
           <p:spPr>
             <a:xfrm>
-              <a:off x="2391353" y="2075180"/>
-              <a:ext cx="3327400" cy="2660273"/>
-            </a:xfrm>
-            <a:prstGeom prst="rect">
-              <a:avLst/>
-            </a:prstGeom>
-          </p:spPr>
-        </p:pic>
-        <p:pic>
-          <p:nvPicPr>
-            <p:cNvPr id="11" name="Picture 10" descr="Shape&#10;&#10;Description automatically generated with low confidence">
-              <a:extLst>
-                <a:ext uri="{FF2B5EF4-FFF2-40B4-BE49-F238E27FC236}">
-                  <a16:creationId xmlns:a16="http://schemas.microsoft.com/office/drawing/2014/main" id="{04527747-095E-5147-BC8F-FECB3591EFCC}"/>
-                </a:ext>
-              </a:extLst>
-            </p:cNvPr>
-            <p:cNvPicPr>
-              <a:picLocks noChangeAspect="1"/>
-            </p:cNvPicPr>
-            <p:nvPr/>
-          </p:nvPicPr>
-          <p:blipFill>
-            <a:blip r:embed="rId3">
-              <a:extLst>
-                <a:ext uri="{837473B0-CC2E-450A-ABE3-18F120FF3D39}">
-                  <a1611:picAttrSrcUrl xmlns:a1611="http://schemas.microsoft.com/office/drawing/2016/11/main" r:id="rId4"/>
-                </a:ext>
-              </a:extLst>
-            </a:blip>
-            <a:stretch>
-              <a:fillRect/>
-            </a:stretch>
-          </p:blipFill>
-          <p:spPr>
-            <a:xfrm flipV="1">
-              <a:off x="7512476" y="3425652"/>
-              <a:ext cx="941173" cy="941173"/>
+              <a:off x="7752998" y="3387977"/>
+              <a:ext cx="2659316" cy="2184108"/>
             </a:xfrm>
             <a:prstGeom prst="rect">
               <a:avLst/>

</xml_diff>